<commit_message>
Made a pass on texturing the L4 ship.
</commit_message>
<xml_diff>
--- a/Assets/Resources/Textures/Cross_Level/Jump_Image_Presentation.pptx
+++ b/Assets/Resources/Textures/Cross_Level/Jump_Image_Presentation.pptx
@@ -288,7 +288,8 @@
           <a:p>
             <a:fld id="{35BC2FEE-321F-44C3-8D63-53F05AD16D75}" type="datetimeFigureOut">
               <a:rPr lang="en-US" smtClean="0"/>
-              <a:t>11/17/2013</a:t>
+              <a:pPr/>
+              <a:t>11/19/2013</a:t>
             </a:fld>
             <a:endParaRPr lang="en-US"/>
           </a:p>
@@ -330,6 +331,7 @@
           <a:p>
             <a:fld id="{41629189-DB74-4C3C-86EE-9032AE8E377B}" type="slidenum">
               <a:rPr lang="en-US" smtClean="0"/>
+              <a:pPr/>
               <a:t>‹#›</a:t>
             </a:fld>
             <a:endParaRPr lang="en-US"/>
@@ -453,7 +455,8 @@
           <a:p>
             <a:fld id="{35BC2FEE-321F-44C3-8D63-53F05AD16D75}" type="datetimeFigureOut">
               <a:rPr lang="en-US" smtClean="0"/>
-              <a:t>11/17/2013</a:t>
+              <a:pPr/>
+              <a:t>11/19/2013</a:t>
             </a:fld>
             <a:endParaRPr lang="en-US"/>
           </a:p>
@@ -495,6 +498,7 @@
           <a:p>
             <a:fld id="{41629189-DB74-4C3C-86EE-9032AE8E377B}" type="slidenum">
               <a:rPr lang="en-US" smtClean="0"/>
+              <a:pPr/>
               <a:t>‹#›</a:t>
             </a:fld>
             <a:endParaRPr lang="en-US"/>
@@ -628,7 +632,8 @@
           <a:p>
             <a:fld id="{35BC2FEE-321F-44C3-8D63-53F05AD16D75}" type="datetimeFigureOut">
               <a:rPr lang="en-US" smtClean="0"/>
-              <a:t>11/17/2013</a:t>
+              <a:pPr/>
+              <a:t>11/19/2013</a:t>
             </a:fld>
             <a:endParaRPr lang="en-US"/>
           </a:p>
@@ -670,6 +675,7 @@
           <a:p>
             <a:fld id="{41629189-DB74-4C3C-86EE-9032AE8E377B}" type="slidenum">
               <a:rPr lang="en-US" smtClean="0"/>
+              <a:pPr/>
               <a:t>‹#›</a:t>
             </a:fld>
             <a:endParaRPr lang="en-US"/>
@@ -793,7 +799,8 @@
           <a:p>
             <a:fld id="{35BC2FEE-321F-44C3-8D63-53F05AD16D75}" type="datetimeFigureOut">
               <a:rPr lang="en-US" smtClean="0"/>
-              <a:t>11/17/2013</a:t>
+              <a:pPr/>
+              <a:t>11/19/2013</a:t>
             </a:fld>
             <a:endParaRPr lang="en-US"/>
           </a:p>
@@ -835,6 +842,7 @@
           <a:p>
             <a:fld id="{41629189-DB74-4C3C-86EE-9032AE8E377B}" type="slidenum">
               <a:rPr lang="en-US" smtClean="0"/>
+              <a:pPr/>
               <a:t>‹#›</a:t>
             </a:fld>
             <a:endParaRPr lang="en-US"/>
@@ -1034,7 +1042,8 @@
           <a:p>
             <a:fld id="{35BC2FEE-321F-44C3-8D63-53F05AD16D75}" type="datetimeFigureOut">
               <a:rPr lang="en-US" smtClean="0"/>
-              <a:t>11/17/2013</a:t>
+              <a:pPr/>
+              <a:t>11/19/2013</a:t>
             </a:fld>
             <a:endParaRPr lang="en-US"/>
           </a:p>
@@ -1076,6 +1085,7 @@
           <a:p>
             <a:fld id="{41629189-DB74-4C3C-86EE-9032AE8E377B}" type="slidenum">
               <a:rPr lang="en-US" smtClean="0"/>
+              <a:pPr/>
               <a:t>‹#›</a:t>
             </a:fld>
             <a:endParaRPr lang="en-US"/>
@@ -1317,7 +1327,8 @@
           <a:p>
             <a:fld id="{35BC2FEE-321F-44C3-8D63-53F05AD16D75}" type="datetimeFigureOut">
               <a:rPr lang="en-US" smtClean="0"/>
-              <a:t>11/17/2013</a:t>
+              <a:pPr/>
+              <a:t>11/19/2013</a:t>
             </a:fld>
             <a:endParaRPr lang="en-US"/>
           </a:p>
@@ -1359,6 +1370,7 @@
           <a:p>
             <a:fld id="{41629189-DB74-4C3C-86EE-9032AE8E377B}" type="slidenum">
               <a:rPr lang="en-US" smtClean="0"/>
+              <a:pPr/>
               <a:t>‹#›</a:t>
             </a:fld>
             <a:endParaRPr lang="en-US"/>
@@ -1734,7 +1746,8 @@
           <a:p>
             <a:fld id="{35BC2FEE-321F-44C3-8D63-53F05AD16D75}" type="datetimeFigureOut">
               <a:rPr lang="en-US" smtClean="0"/>
-              <a:t>11/17/2013</a:t>
+              <a:pPr/>
+              <a:t>11/19/2013</a:t>
             </a:fld>
             <a:endParaRPr lang="en-US"/>
           </a:p>
@@ -1776,6 +1789,7 @@
           <a:p>
             <a:fld id="{41629189-DB74-4C3C-86EE-9032AE8E377B}" type="slidenum">
               <a:rPr lang="en-US" smtClean="0"/>
+              <a:pPr/>
               <a:t>‹#›</a:t>
             </a:fld>
             <a:endParaRPr lang="en-US"/>
@@ -1847,7 +1861,8 @@
           <a:p>
             <a:fld id="{35BC2FEE-321F-44C3-8D63-53F05AD16D75}" type="datetimeFigureOut">
               <a:rPr lang="en-US" smtClean="0"/>
-              <a:t>11/17/2013</a:t>
+              <a:pPr/>
+              <a:t>11/19/2013</a:t>
             </a:fld>
             <a:endParaRPr lang="en-US"/>
           </a:p>
@@ -1889,6 +1904,7 @@
           <a:p>
             <a:fld id="{41629189-DB74-4C3C-86EE-9032AE8E377B}" type="slidenum">
               <a:rPr lang="en-US" smtClean="0"/>
+              <a:pPr/>
               <a:t>‹#›</a:t>
             </a:fld>
             <a:endParaRPr lang="en-US"/>
@@ -1937,7 +1953,8 @@
           <a:p>
             <a:fld id="{35BC2FEE-321F-44C3-8D63-53F05AD16D75}" type="datetimeFigureOut">
               <a:rPr lang="en-US" smtClean="0"/>
-              <a:t>11/17/2013</a:t>
+              <a:pPr/>
+              <a:t>11/19/2013</a:t>
             </a:fld>
             <a:endParaRPr lang="en-US"/>
           </a:p>
@@ -1979,6 +1996,7 @@
           <a:p>
             <a:fld id="{41629189-DB74-4C3C-86EE-9032AE8E377B}" type="slidenum">
               <a:rPr lang="en-US" smtClean="0"/>
+              <a:pPr/>
               <a:t>‹#›</a:t>
             </a:fld>
             <a:endParaRPr lang="en-US"/>
@@ -2209,7 +2227,8 @@
           <a:p>
             <a:fld id="{35BC2FEE-321F-44C3-8D63-53F05AD16D75}" type="datetimeFigureOut">
               <a:rPr lang="en-US" smtClean="0"/>
-              <a:t>11/17/2013</a:t>
+              <a:pPr/>
+              <a:t>11/19/2013</a:t>
             </a:fld>
             <a:endParaRPr lang="en-US"/>
           </a:p>
@@ -2251,6 +2270,7 @@
           <a:p>
             <a:fld id="{41629189-DB74-4C3C-86EE-9032AE8E377B}" type="slidenum">
               <a:rPr lang="en-US" smtClean="0"/>
+              <a:pPr/>
               <a:t>‹#›</a:t>
             </a:fld>
             <a:endParaRPr lang="en-US"/>
@@ -2457,7 +2477,8 @@
           <a:p>
             <a:fld id="{35BC2FEE-321F-44C3-8D63-53F05AD16D75}" type="datetimeFigureOut">
               <a:rPr lang="en-US" smtClean="0"/>
-              <a:t>11/17/2013</a:t>
+              <a:pPr/>
+              <a:t>11/19/2013</a:t>
             </a:fld>
             <a:endParaRPr lang="en-US"/>
           </a:p>
@@ -2499,6 +2520,7 @@
           <a:p>
             <a:fld id="{41629189-DB74-4C3C-86EE-9032AE8E377B}" type="slidenum">
               <a:rPr lang="en-US" smtClean="0"/>
+              <a:pPr/>
               <a:t>‹#›</a:t>
             </a:fld>
             <a:endParaRPr lang="en-US"/>
@@ -2665,7 +2687,8 @@
           <a:p>
             <a:fld id="{35BC2FEE-321F-44C3-8D63-53F05AD16D75}" type="datetimeFigureOut">
               <a:rPr lang="en-US" smtClean="0"/>
-              <a:t>11/17/2013</a:t>
+              <a:pPr/>
+              <a:t>11/19/2013</a:t>
             </a:fld>
             <a:endParaRPr lang="en-US"/>
           </a:p>
@@ -2743,6 +2766,7 @@
           <a:p>
             <a:fld id="{41629189-DB74-4C3C-86EE-9032AE8E377B}" type="slidenum">
               <a:rPr lang="en-US" smtClean="0"/>
+              <a:pPr/>
               <a:t>‹#›</a:t>
             </a:fld>
             <a:endParaRPr lang="en-US"/>

</xml_diff>